<commit_message>
commit after maven workshop
</commit_message>
<xml_diff>
--- a/workshops/3.Exceptions.pptx
+++ b/workshops/3.Exceptions.pptx
@@ -747,7 +747,7 @@
             <a:fld id="{1D8BD707-D9CF-40AE-B4C6-C98DA3205C09}" type="datetimeFigureOut">
               <a:rPr lang="en-US" smtClean="0"/>
               <a:pPr/>
-              <a:t>10/26/2014</a:t>
+              <a:t>10/27/2014</a:t>
             </a:fld>
             <a:endParaRPr lang="en-US"/>
           </a:p>
@@ -946,7 +946,7 @@
             <a:fld id="{1D8BD707-D9CF-40AE-B4C6-C98DA3205C09}" type="datetimeFigureOut">
               <a:rPr lang="en-US" smtClean="0"/>
               <a:pPr/>
-              <a:t>10/26/2014</a:t>
+              <a:t>10/27/2014</a:t>
             </a:fld>
             <a:endParaRPr lang="en-US"/>
           </a:p>
@@ -1134,7 +1134,7 @@
             <a:fld id="{1D8BD707-D9CF-40AE-B4C6-C98DA3205C09}" type="datetimeFigureOut">
               <a:rPr lang="en-US" smtClean="0"/>
               <a:pPr/>
-              <a:t>10/26/2014</a:t>
+              <a:t>10/27/2014</a:t>
             </a:fld>
             <a:endParaRPr lang="en-US"/>
           </a:p>
@@ -1287,7 +1287,7 @@
             <a:fld id="{1D8BD707-D9CF-40AE-B4C6-C98DA3205C09}" type="datetimeFigureOut">
               <a:rPr lang="en-US" smtClean="0"/>
               <a:pPr/>
-              <a:t>10/26/2014</a:t>
+              <a:t>10/27/2014</a:t>
             </a:fld>
             <a:endParaRPr lang="en-US"/>
           </a:p>
@@ -1545,7 +1545,7 @@
             <a:fld id="{1D8BD707-D9CF-40AE-B4C6-C98DA3205C09}" type="datetimeFigureOut">
               <a:rPr lang="en-US" smtClean="0"/>
               <a:pPr/>
-              <a:t>10/26/2014</a:t>
+              <a:t>10/27/2014</a:t>
             </a:fld>
             <a:endParaRPr lang="en-US"/>
           </a:p>
@@ -1957,7 +1957,7 @@
             <a:fld id="{1D8BD707-D9CF-40AE-B4C6-C98DA3205C09}" type="datetimeFigureOut">
               <a:rPr lang="en-US" smtClean="0"/>
               <a:pPr/>
-              <a:t>10/26/2014</a:t>
+              <a:t>10/27/2014</a:t>
             </a:fld>
             <a:endParaRPr lang="en-US"/>
           </a:p>
@@ -2406,7 +2406,7 @@
             <a:fld id="{1D8BD707-D9CF-40AE-B4C6-C98DA3205C09}" type="datetimeFigureOut">
               <a:rPr lang="en-US" smtClean="0"/>
               <a:pPr/>
-              <a:t>10/26/2014</a:t>
+              <a:t>10/27/2014</a:t>
             </a:fld>
             <a:endParaRPr lang="en-US"/>
           </a:p>
@@ -2510,7 +2510,7 @@
             <a:fld id="{1D8BD707-D9CF-40AE-B4C6-C98DA3205C09}" type="datetimeFigureOut">
               <a:rPr lang="en-US" smtClean="0"/>
               <a:pPr/>
-              <a:t>10/26/2014</a:t>
+              <a:t>10/27/2014</a:t>
             </a:fld>
             <a:endParaRPr lang="en-US"/>
           </a:p>
@@ -2634,7 +2634,7 @@
             <a:fld id="{1D8BD707-D9CF-40AE-B4C6-C98DA3205C09}" type="datetimeFigureOut">
               <a:rPr lang="en-US" smtClean="0"/>
               <a:pPr/>
-              <a:t>10/26/2014</a:t>
+              <a:t>10/27/2014</a:t>
             </a:fld>
             <a:endParaRPr lang="en-US"/>
           </a:p>
@@ -2911,7 +2911,7 @@
             <a:fld id="{1D8BD707-D9CF-40AE-B4C6-C98DA3205C09}" type="datetimeFigureOut">
               <a:rPr lang="en-US" smtClean="0"/>
               <a:pPr/>
-              <a:t>10/26/2014</a:t>
+              <a:t>10/27/2014</a:t>
             </a:fld>
             <a:endParaRPr lang="en-US"/>
           </a:p>
@@ -3119,7 +3119,7 @@
             <a:fld id="{1D8BD707-D9CF-40AE-B4C6-C98DA3205C09}" type="datetimeFigureOut">
               <a:rPr lang="en-US" smtClean="0"/>
               <a:pPr/>
-              <a:t>10/26/2014</a:t>
+              <a:t>10/27/2014</a:t>
             </a:fld>
             <a:endParaRPr lang="en-US"/>
           </a:p>
@@ -4231,7 +4231,7 @@
             <a:fld id="{1D8BD707-D9CF-40AE-B4C6-C98DA3205C09}" type="datetimeFigureOut">
               <a:rPr lang="en-US" smtClean="0"/>
               <a:pPr/>
-              <a:t>10/26/2014</a:t>
+              <a:t>10/27/2014</a:t>
             </a:fld>
             <a:endParaRPr lang="en-US"/>
           </a:p>
@@ -5616,83 +5616,51 @@
           <a:p>
             <a:pPr algn="just"/>
             <a:r>
-              <a:rPr lang="en-US" b="1" dirty="0" smtClean="0"/>
-              <a:t>Use exceptions only for exceptional </a:t>
-            </a:r>
-            <a:r>
-              <a:rPr lang="en-US" b="1" dirty="0" smtClean="0"/>
-              <a:t>conditions</a:t>
+              <a:rPr lang="en-US" dirty="0" smtClean="0"/>
+              <a:t>Use exceptions only for exceptional conditions</a:t>
             </a:r>
           </a:p>
           <a:p>
             <a:pPr algn="just"/>
             <a:r>
-              <a:rPr lang="en-US" b="1" dirty="0" smtClean="0"/>
-              <a:t>Use checked exceptions for recoverable conditions </a:t>
-            </a:r>
-            <a:r>
-              <a:rPr lang="en-US" b="1" dirty="0" smtClean="0"/>
-              <a:t>and runtime </a:t>
-            </a:r>
-            <a:r>
-              <a:rPr lang="en-US" b="1" dirty="0" smtClean="0"/>
-              <a:t>exceptions for programming </a:t>
-            </a:r>
-            <a:r>
-              <a:rPr lang="en-US" b="1" dirty="0" smtClean="0"/>
-              <a:t>errors</a:t>
+              <a:rPr lang="en-US" dirty="0" smtClean="0"/>
+              <a:t>Use checked exceptions for recoverable conditions and runtime exceptions for programming errors</a:t>
             </a:r>
           </a:p>
           <a:p>
             <a:pPr algn="just"/>
             <a:r>
-              <a:rPr lang="en-US" b="1" dirty="0" smtClean="0"/>
-              <a:t>Avoid unnecessary use of checked </a:t>
-            </a:r>
-            <a:r>
-              <a:rPr lang="en-US" b="1" dirty="0" smtClean="0"/>
-              <a:t>exceptions</a:t>
+              <a:rPr lang="en-US" dirty="0" smtClean="0"/>
+              <a:t>Avoid unnecessary use of checked exceptions</a:t>
             </a:r>
           </a:p>
           <a:p>
             <a:pPr algn="just"/>
             <a:r>
-              <a:rPr lang="en-US" b="1" dirty="0" smtClean="0"/>
-              <a:t>Favor the use of standard </a:t>
-            </a:r>
-            <a:r>
-              <a:rPr lang="en-US" b="1" dirty="0" smtClean="0"/>
-              <a:t>exceptions</a:t>
+              <a:rPr lang="en-US" dirty="0" smtClean="0"/>
+              <a:t>Favor the use of standard exceptions</a:t>
             </a:r>
           </a:p>
           <a:p>
             <a:pPr algn="just"/>
             <a:r>
-              <a:rPr lang="ro-RO" b="1" dirty="0" smtClean="0"/>
-              <a:t>Include failure-capture information in detail </a:t>
-            </a:r>
-            <a:r>
-              <a:rPr lang="ro-RO" b="1" dirty="0" smtClean="0"/>
-              <a:t>messages</a:t>
-            </a:r>
-            <a:endParaRPr lang="en-US" b="1" dirty="0" smtClean="0"/>
+              <a:rPr lang="ro-RO" dirty="0" smtClean="0"/>
+              <a:t>Include failure-capture information in detail messages</a:t>
+            </a:r>
+            <a:endParaRPr lang="en-US" dirty="0" smtClean="0"/>
           </a:p>
           <a:p>
             <a:pPr algn="just"/>
             <a:r>
-              <a:rPr lang="ro-RO" b="1" dirty="0" smtClean="0"/>
-              <a:t>Strive for failure </a:t>
-            </a:r>
-            <a:r>
-              <a:rPr lang="ro-RO" b="1" dirty="0" smtClean="0"/>
-              <a:t>atomicity</a:t>
-            </a:r>
-            <a:endParaRPr lang="en-US" b="1" dirty="0" smtClean="0"/>
+              <a:rPr lang="ro-RO" dirty="0" smtClean="0"/>
+              <a:t>Strive for failure atomicity</a:t>
+            </a:r>
+            <a:endParaRPr lang="en-US" dirty="0" smtClean="0"/>
           </a:p>
           <a:p>
             <a:pPr algn="just"/>
             <a:r>
-              <a:rPr lang="ro-RO" b="1" dirty="0" smtClean="0"/>
+              <a:rPr lang="ro-RO" dirty="0" smtClean="0"/>
               <a:t>Don’t ignore exceptions</a:t>
             </a:r>
             <a:endParaRPr lang="ro-RO" dirty="0"/>

</xml_diff>